<commit_message>
legend to the plot
</commit_message>
<xml_diff>
--- a/slides/итоги грамматика мотива.pptx
+++ b/slides/итоги грамматика мотива.pptx
@@ -718,11 +718,11 @@
         </c:dLbls>
         <c:gapWidth val="46"/>
         <c:overlap val="-27"/>
-        <c:axId val="-1978651360"/>
-        <c:axId val="-1978649584"/>
+        <c:axId val="491048000"/>
+        <c:axId val="491049776"/>
       </c:barChart>
       <c:catAx>
-        <c:axId val="-1978651360"/>
+        <c:axId val="491048000"/>
         <c:scaling>
           <c:orientation val="minMax"/>
         </c:scaling>
@@ -765,7 +765,7 @@
             <a:endParaRPr lang="ru-RU"/>
           </a:p>
         </c:txPr>
-        <c:crossAx val="-1978649584"/>
+        <c:crossAx val="491049776"/>
         <c:crosses val="autoZero"/>
         <c:auto val="1"/>
         <c:lblAlgn val="ctr"/>
@@ -773,7 +773,7 @@
         <c:noMultiLvlLbl val="0"/>
       </c:catAx>
       <c:valAx>
-        <c:axId val="-1978649584"/>
+        <c:axId val="491049776"/>
         <c:scaling>
           <c:orientation val="minMax"/>
         </c:scaling>
@@ -830,7 +830,7 @@
             <a:endParaRPr lang="ru-RU"/>
           </a:p>
         </c:txPr>
-        <c:crossAx val="-1978651360"/>
+        <c:crossAx val="491048000"/>
         <c:crosses val="autoZero"/>
         <c:crossBetween val="between"/>
       </c:valAx>
@@ -1914,7 +1914,7 @@
           <p:cNvPr id="2" name="Заголовок 1">
             <a:extLst>
               <a:ext uri="{FF2B5EF4-FFF2-40B4-BE49-F238E27FC236}">
-                <a16:creationId xmlns:a16="http://schemas.microsoft.com/office/drawing/2014/main" xmlns="" id="{39B1E86E-3EFA-4319-B12F-676E64AFA1BC}"/>
+                <a16:creationId xmlns="" xmlns:a16="http://schemas.microsoft.com/office/drawing/2014/main" id="{39B1E86E-3EFA-4319-B12F-676E64AFA1BC}"/>
               </a:ext>
             </a:extLst>
           </p:cNvPr>
@@ -1951,7 +1951,7 @@
           <p:cNvPr id="3" name="Подзаголовок 2">
             <a:extLst>
               <a:ext uri="{FF2B5EF4-FFF2-40B4-BE49-F238E27FC236}">
-                <a16:creationId xmlns:a16="http://schemas.microsoft.com/office/drawing/2014/main" xmlns="" id="{EF1285B7-1B28-468C-AF86-310788BD4448}"/>
+                <a16:creationId xmlns="" xmlns:a16="http://schemas.microsoft.com/office/drawing/2014/main" id="{EF1285B7-1B28-468C-AF86-310788BD4448}"/>
               </a:ext>
             </a:extLst>
           </p:cNvPr>
@@ -2021,7 +2021,7 @@
           <p:cNvPr id="4" name="Дата 3">
             <a:extLst>
               <a:ext uri="{FF2B5EF4-FFF2-40B4-BE49-F238E27FC236}">
-                <a16:creationId xmlns:a16="http://schemas.microsoft.com/office/drawing/2014/main" xmlns="" id="{7BFD86B0-1919-4C62-8ADE-615444F48D5D}"/>
+                <a16:creationId xmlns="" xmlns:a16="http://schemas.microsoft.com/office/drawing/2014/main" id="{7BFD86B0-1919-4C62-8ADE-615444F48D5D}"/>
               </a:ext>
             </a:extLst>
           </p:cNvPr>
@@ -2050,7 +2050,7 @@
           <p:cNvPr id="5" name="Нижний колонтитул 4">
             <a:extLst>
               <a:ext uri="{FF2B5EF4-FFF2-40B4-BE49-F238E27FC236}">
-                <a16:creationId xmlns:a16="http://schemas.microsoft.com/office/drawing/2014/main" xmlns="" id="{9A055089-4621-4417-8966-783F8D0E5B2A}"/>
+                <a16:creationId xmlns="" xmlns:a16="http://schemas.microsoft.com/office/drawing/2014/main" id="{9A055089-4621-4417-8966-783F8D0E5B2A}"/>
               </a:ext>
             </a:extLst>
           </p:cNvPr>
@@ -2075,7 +2075,7 @@
           <p:cNvPr id="6" name="Номер слайда 5">
             <a:extLst>
               <a:ext uri="{FF2B5EF4-FFF2-40B4-BE49-F238E27FC236}">
-                <a16:creationId xmlns:a16="http://schemas.microsoft.com/office/drawing/2014/main" xmlns="" id="{88B192E3-D192-4A43-A129-E30F714DB248}"/>
+                <a16:creationId xmlns="" xmlns:a16="http://schemas.microsoft.com/office/drawing/2014/main" id="{88B192E3-D192-4A43-A129-E30F714DB248}"/>
               </a:ext>
             </a:extLst>
           </p:cNvPr>
@@ -2134,7 +2134,7 @@
           <p:cNvPr id="2" name="Заголовок 1">
             <a:extLst>
               <a:ext uri="{FF2B5EF4-FFF2-40B4-BE49-F238E27FC236}">
-                <a16:creationId xmlns:a16="http://schemas.microsoft.com/office/drawing/2014/main" xmlns="" id="{0DCCD554-E06C-490A-9972-F26BE37C41A7}"/>
+                <a16:creationId xmlns="" xmlns:a16="http://schemas.microsoft.com/office/drawing/2014/main" id="{0DCCD554-E06C-490A-9972-F26BE37C41A7}"/>
               </a:ext>
             </a:extLst>
           </p:cNvPr>
@@ -2162,7 +2162,7 @@
           <p:cNvPr id="3" name="Вертикальный текст 2">
             <a:extLst>
               <a:ext uri="{FF2B5EF4-FFF2-40B4-BE49-F238E27FC236}">
-                <a16:creationId xmlns:a16="http://schemas.microsoft.com/office/drawing/2014/main" xmlns="" id="{BFF46614-0064-4926-8070-F75D0CC698F1}"/>
+                <a16:creationId xmlns="" xmlns:a16="http://schemas.microsoft.com/office/drawing/2014/main" id="{BFF46614-0064-4926-8070-F75D0CC698F1}"/>
               </a:ext>
             </a:extLst>
           </p:cNvPr>
@@ -2219,7 +2219,7 @@
           <p:cNvPr id="4" name="Дата 3">
             <a:extLst>
               <a:ext uri="{FF2B5EF4-FFF2-40B4-BE49-F238E27FC236}">
-                <a16:creationId xmlns:a16="http://schemas.microsoft.com/office/drawing/2014/main" xmlns="" id="{14D9B84A-7F1F-4D72-AA10-BF277DF1D87E}"/>
+                <a16:creationId xmlns="" xmlns:a16="http://schemas.microsoft.com/office/drawing/2014/main" id="{14D9B84A-7F1F-4D72-AA10-BF277DF1D87E}"/>
               </a:ext>
             </a:extLst>
           </p:cNvPr>
@@ -2248,7 +2248,7 @@
           <p:cNvPr id="5" name="Нижний колонтитул 4">
             <a:extLst>
               <a:ext uri="{FF2B5EF4-FFF2-40B4-BE49-F238E27FC236}">
-                <a16:creationId xmlns:a16="http://schemas.microsoft.com/office/drawing/2014/main" xmlns="" id="{EB07F89B-13FD-41E6-AC57-8313594EFAD3}"/>
+                <a16:creationId xmlns="" xmlns:a16="http://schemas.microsoft.com/office/drawing/2014/main" id="{EB07F89B-13FD-41E6-AC57-8313594EFAD3}"/>
               </a:ext>
             </a:extLst>
           </p:cNvPr>
@@ -2273,7 +2273,7 @@
           <p:cNvPr id="6" name="Номер слайда 5">
             <a:extLst>
               <a:ext uri="{FF2B5EF4-FFF2-40B4-BE49-F238E27FC236}">
-                <a16:creationId xmlns:a16="http://schemas.microsoft.com/office/drawing/2014/main" xmlns="" id="{4F80F7A0-FECA-4122-92B4-5F2BC42DA095}"/>
+                <a16:creationId xmlns="" xmlns:a16="http://schemas.microsoft.com/office/drawing/2014/main" id="{4F80F7A0-FECA-4122-92B4-5F2BC42DA095}"/>
               </a:ext>
             </a:extLst>
           </p:cNvPr>
@@ -2332,7 +2332,7 @@
           <p:cNvPr id="2" name="Вертикальный заголовок 1">
             <a:extLst>
               <a:ext uri="{FF2B5EF4-FFF2-40B4-BE49-F238E27FC236}">
-                <a16:creationId xmlns:a16="http://schemas.microsoft.com/office/drawing/2014/main" xmlns="" id="{9028EB5B-F1E7-40DF-B812-4EF9FF154A4F}"/>
+                <a16:creationId xmlns="" xmlns:a16="http://schemas.microsoft.com/office/drawing/2014/main" id="{9028EB5B-F1E7-40DF-B812-4EF9FF154A4F}"/>
               </a:ext>
             </a:extLst>
           </p:cNvPr>
@@ -2365,7 +2365,7 @@
           <p:cNvPr id="3" name="Вертикальный текст 2">
             <a:extLst>
               <a:ext uri="{FF2B5EF4-FFF2-40B4-BE49-F238E27FC236}">
-                <a16:creationId xmlns:a16="http://schemas.microsoft.com/office/drawing/2014/main" xmlns="" id="{B573C278-F290-4FE3-9E8B-DA64845FB64C}"/>
+                <a16:creationId xmlns="" xmlns:a16="http://schemas.microsoft.com/office/drawing/2014/main" id="{B573C278-F290-4FE3-9E8B-DA64845FB64C}"/>
               </a:ext>
             </a:extLst>
           </p:cNvPr>
@@ -2427,7 +2427,7 @@
           <p:cNvPr id="4" name="Дата 3">
             <a:extLst>
               <a:ext uri="{FF2B5EF4-FFF2-40B4-BE49-F238E27FC236}">
-                <a16:creationId xmlns:a16="http://schemas.microsoft.com/office/drawing/2014/main" xmlns="" id="{A367508C-B13B-4948-8A08-E5265820859D}"/>
+                <a16:creationId xmlns="" xmlns:a16="http://schemas.microsoft.com/office/drawing/2014/main" id="{A367508C-B13B-4948-8A08-E5265820859D}"/>
               </a:ext>
             </a:extLst>
           </p:cNvPr>
@@ -2456,7 +2456,7 @@
           <p:cNvPr id="5" name="Нижний колонтитул 4">
             <a:extLst>
               <a:ext uri="{FF2B5EF4-FFF2-40B4-BE49-F238E27FC236}">
-                <a16:creationId xmlns:a16="http://schemas.microsoft.com/office/drawing/2014/main" xmlns="" id="{0A7226C2-3487-4C91-8CA4-539A1A06E5F4}"/>
+                <a16:creationId xmlns="" xmlns:a16="http://schemas.microsoft.com/office/drawing/2014/main" id="{0A7226C2-3487-4C91-8CA4-539A1A06E5F4}"/>
               </a:ext>
             </a:extLst>
           </p:cNvPr>
@@ -2481,7 +2481,7 @@
           <p:cNvPr id="6" name="Номер слайда 5">
             <a:extLst>
               <a:ext uri="{FF2B5EF4-FFF2-40B4-BE49-F238E27FC236}">
-                <a16:creationId xmlns:a16="http://schemas.microsoft.com/office/drawing/2014/main" xmlns="" id="{0A616899-FE0B-461A-856E-77C00B4FFDB4}"/>
+                <a16:creationId xmlns="" xmlns:a16="http://schemas.microsoft.com/office/drawing/2014/main" id="{0A616899-FE0B-461A-856E-77C00B4FFDB4}"/>
               </a:ext>
             </a:extLst>
           </p:cNvPr>
@@ -2540,7 +2540,7 @@
           <p:cNvPr id="2" name="Заголовок 1">
             <a:extLst>
               <a:ext uri="{FF2B5EF4-FFF2-40B4-BE49-F238E27FC236}">
-                <a16:creationId xmlns:a16="http://schemas.microsoft.com/office/drawing/2014/main" xmlns="" id="{973D9CCC-D296-4608-B8B8-8A8C8E72DEDE}"/>
+                <a16:creationId xmlns="" xmlns:a16="http://schemas.microsoft.com/office/drawing/2014/main" id="{973D9CCC-D296-4608-B8B8-8A8C8E72DEDE}"/>
               </a:ext>
             </a:extLst>
           </p:cNvPr>
@@ -2568,7 +2568,7 @@
           <p:cNvPr id="3" name="Объект 2">
             <a:extLst>
               <a:ext uri="{FF2B5EF4-FFF2-40B4-BE49-F238E27FC236}">
-                <a16:creationId xmlns:a16="http://schemas.microsoft.com/office/drawing/2014/main" xmlns="" id="{5055A155-2D2C-4115-B69F-FA7DE1FAF6D6}"/>
+                <a16:creationId xmlns="" xmlns:a16="http://schemas.microsoft.com/office/drawing/2014/main" id="{5055A155-2D2C-4115-B69F-FA7DE1FAF6D6}"/>
               </a:ext>
             </a:extLst>
           </p:cNvPr>
@@ -2625,7 +2625,7 @@
           <p:cNvPr id="4" name="Дата 3">
             <a:extLst>
               <a:ext uri="{FF2B5EF4-FFF2-40B4-BE49-F238E27FC236}">
-                <a16:creationId xmlns:a16="http://schemas.microsoft.com/office/drawing/2014/main" xmlns="" id="{BB051582-EEBD-42E8-8975-F5B36B13DAC0}"/>
+                <a16:creationId xmlns="" xmlns:a16="http://schemas.microsoft.com/office/drawing/2014/main" id="{BB051582-EEBD-42E8-8975-F5B36B13DAC0}"/>
               </a:ext>
             </a:extLst>
           </p:cNvPr>
@@ -2654,7 +2654,7 @@
           <p:cNvPr id="5" name="Нижний колонтитул 4">
             <a:extLst>
               <a:ext uri="{FF2B5EF4-FFF2-40B4-BE49-F238E27FC236}">
-                <a16:creationId xmlns:a16="http://schemas.microsoft.com/office/drawing/2014/main" xmlns="" id="{3402C84A-602D-489B-BAB3-9DBB1F7C11E3}"/>
+                <a16:creationId xmlns="" xmlns:a16="http://schemas.microsoft.com/office/drawing/2014/main" id="{3402C84A-602D-489B-BAB3-9DBB1F7C11E3}"/>
               </a:ext>
             </a:extLst>
           </p:cNvPr>
@@ -2679,7 +2679,7 @@
           <p:cNvPr id="6" name="Номер слайда 5">
             <a:extLst>
               <a:ext uri="{FF2B5EF4-FFF2-40B4-BE49-F238E27FC236}">
-                <a16:creationId xmlns:a16="http://schemas.microsoft.com/office/drawing/2014/main" xmlns="" id="{D826ED1F-4ED1-4D2A-9060-4F05DC062F43}"/>
+                <a16:creationId xmlns="" xmlns:a16="http://schemas.microsoft.com/office/drawing/2014/main" id="{D826ED1F-4ED1-4D2A-9060-4F05DC062F43}"/>
               </a:ext>
             </a:extLst>
           </p:cNvPr>
@@ -2738,7 +2738,7 @@
           <p:cNvPr id="2" name="Заголовок 1">
             <a:extLst>
               <a:ext uri="{FF2B5EF4-FFF2-40B4-BE49-F238E27FC236}">
-                <a16:creationId xmlns:a16="http://schemas.microsoft.com/office/drawing/2014/main" xmlns="" id="{2A852532-EC37-47BE-9FEE-CD7A5967874D}"/>
+                <a16:creationId xmlns="" xmlns:a16="http://schemas.microsoft.com/office/drawing/2014/main" id="{2A852532-EC37-47BE-9FEE-CD7A5967874D}"/>
               </a:ext>
             </a:extLst>
           </p:cNvPr>
@@ -2775,7 +2775,7 @@
           <p:cNvPr id="3" name="Текст 2">
             <a:extLst>
               <a:ext uri="{FF2B5EF4-FFF2-40B4-BE49-F238E27FC236}">
-                <a16:creationId xmlns:a16="http://schemas.microsoft.com/office/drawing/2014/main" xmlns="" id="{05592528-F21C-410D-86B5-D96451C2C98F}"/>
+                <a16:creationId xmlns="" xmlns:a16="http://schemas.microsoft.com/office/drawing/2014/main" id="{05592528-F21C-410D-86B5-D96451C2C98F}"/>
               </a:ext>
             </a:extLst>
           </p:cNvPr>
@@ -2900,7 +2900,7 @@
           <p:cNvPr id="4" name="Дата 3">
             <a:extLst>
               <a:ext uri="{FF2B5EF4-FFF2-40B4-BE49-F238E27FC236}">
-                <a16:creationId xmlns:a16="http://schemas.microsoft.com/office/drawing/2014/main" xmlns="" id="{52C3B689-6404-495E-AA3F-7329E2B9835F}"/>
+                <a16:creationId xmlns="" xmlns:a16="http://schemas.microsoft.com/office/drawing/2014/main" id="{52C3B689-6404-495E-AA3F-7329E2B9835F}"/>
               </a:ext>
             </a:extLst>
           </p:cNvPr>
@@ -2929,7 +2929,7 @@
           <p:cNvPr id="5" name="Нижний колонтитул 4">
             <a:extLst>
               <a:ext uri="{FF2B5EF4-FFF2-40B4-BE49-F238E27FC236}">
-                <a16:creationId xmlns:a16="http://schemas.microsoft.com/office/drawing/2014/main" xmlns="" id="{1653DF90-3E51-45F7-AAEC-E08E66C73E13}"/>
+                <a16:creationId xmlns="" xmlns:a16="http://schemas.microsoft.com/office/drawing/2014/main" id="{1653DF90-3E51-45F7-AAEC-E08E66C73E13}"/>
               </a:ext>
             </a:extLst>
           </p:cNvPr>
@@ -2954,7 +2954,7 @@
           <p:cNvPr id="6" name="Номер слайда 5">
             <a:extLst>
               <a:ext uri="{FF2B5EF4-FFF2-40B4-BE49-F238E27FC236}">
-                <a16:creationId xmlns:a16="http://schemas.microsoft.com/office/drawing/2014/main" xmlns="" id="{2AFD0262-BBF3-4381-9E99-DBDA637A229A}"/>
+                <a16:creationId xmlns="" xmlns:a16="http://schemas.microsoft.com/office/drawing/2014/main" id="{2AFD0262-BBF3-4381-9E99-DBDA637A229A}"/>
               </a:ext>
             </a:extLst>
           </p:cNvPr>
@@ -3013,7 +3013,7 @@
           <p:cNvPr id="2" name="Заголовок 1">
             <a:extLst>
               <a:ext uri="{FF2B5EF4-FFF2-40B4-BE49-F238E27FC236}">
-                <a16:creationId xmlns:a16="http://schemas.microsoft.com/office/drawing/2014/main" xmlns="" id="{B1EC5F0C-25A3-4DD4-8AE9-DB8A620EF079}"/>
+                <a16:creationId xmlns="" xmlns:a16="http://schemas.microsoft.com/office/drawing/2014/main" id="{B1EC5F0C-25A3-4DD4-8AE9-DB8A620EF079}"/>
               </a:ext>
             </a:extLst>
           </p:cNvPr>
@@ -3041,7 +3041,7 @@
           <p:cNvPr id="3" name="Объект 2">
             <a:extLst>
               <a:ext uri="{FF2B5EF4-FFF2-40B4-BE49-F238E27FC236}">
-                <a16:creationId xmlns:a16="http://schemas.microsoft.com/office/drawing/2014/main" xmlns="" id="{E90A60C7-2CF6-492A-A6B6-9926BB95D3ED}"/>
+                <a16:creationId xmlns="" xmlns:a16="http://schemas.microsoft.com/office/drawing/2014/main" id="{E90A60C7-2CF6-492A-A6B6-9926BB95D3ED}"/>
               </a:ext>
             </a:extLst>
           </p:cNvPr>
@@ -3103,7 +3103,7 @@
           <p:cNvPr id="4" name="Объект 3">
             <a:extLst>
               <a:ext uri="{FF2B5EF4-FFF2-40B4-BE49-F238E27FC236}">
-                <a16:creationId xmlns:a16="http://schemas.microsoft.com/office/drawing/2014/main" xmlns="" id="{E7D49D22-E81C-4AA6-8DFF-2318D3978F77}"/>
+                <a16:creationId xmlns="" xmlns:a16="http://schemas.microsoft.com/office/drawing/2014/main" id="{E7D49D22-E81C-4AA6-8DFF-2318D3978F77}"/>
               </a:ext>
             </a:extLst>
           </p:cNvPr>
@@ -3165,7 +3165,7 @@
           <p:cNvPr id="5" name="Дата 4">
             <a:extLst>
               <a:ext uri="{FF2B5EF4-FFF2-40B4-BE49-F238E27FC236}">
-                <a16:creationId xmlns:a16="http://schemas.microsoft.com/office/drawing/2014/main" xmlns="" id="{9ECF81E0-6E4F-430B-BCC7-32637ABF1078}"/>
+                <a16:creationId xmlns="" xmlns:a16="http://schemas.microsoft.com/office/drawing/2014/main" id="{9ECF81E0-6E4F-430B-BCC7-32637ABF1078}"/>
               </a:ext>
             </a:extLst>
           </p:cNvPr>
@@ -3194,7 +3194,7 @@
           <p:cNvPr id="6" name="Нижний колонтитул 5">
             <a:extLst>
               <a:ext uri="{FF2B5EF4-FFF2-40B4-BE49-F238E27FC236}">
-                <a16:creationId xmlns:a16="http://schemas.microsoft.com/office/drawing/2014/main" xmlns="" id="{F880E6D3-1011-4FFF-9E47-8DC74D91AB99}"/>
+                <a16:creationId xmlns="" xmlns:a16="http://schemas.microsoft.com/office/drawing/2014/main" id="{F880E6D3-1011-4FFF-9E47-8DC74D91AB99}"/>
               </a:ext>
             </a:extLst>
           </p:cNvPr>
@@ -3219,7 +3219,7 @@
           <p:cNvPr id="7" name="Номер слайда 6">
             <a:extLst>
               <a:ext uri="{FF2B5EF4-FFF2-40B4-BE49-F238E27FC236}">
-                <a16:creationId xmlns:a16="http://schemas.microsoft.com/office/drawing/2014/main" xmlns="" id="{195337BE-8BB7-4B72-BB5B-589526DCC6A2}"/>
+                <a16:creationId xmlns="" xmlns:a16="http://schemas.microsoft.com/office/drawing/2014/main" id="{195337BE-8BB7-4B72-BB5B-589526DCC6A2}"/>
               </a:ext>
             </a:extLst>
           </p:cNvPr>
@@ -3278,7 +3278,7 @@
           <p:cNvPr id="2" name="Заголовок 1">
             <a:extLst>
               <a:ext uri="{FF2B5EF4-FFF2-40B4-BE49-F238E27FC236}">
-                <a16:creationId xmlns:a16="http://schemas.microsoft.com/office/drawing/2014/main" xmlns="" id="{5B706855-4721-4771-82CB-4771375D63D1}"/>
+                <a16:creationId xmlns="" xmlns:a16="http://schemas.microsoft.com/office/drawing/2014/main" id="{5B706855-4721-4771-82CB-4771375D63D1}"/>
               </a:ext>
             </a:extLst>
           </p:cNvPr>
@@ -3311,7 +3311,7 @@
           <p:cNvPr id="3" name="Текст 2">
             <a:extLst>
               <a:ext uri="{FF2B5EF4-FFF2-40B4-BE49-F238E27FC236}">
-                <a16:creationId xmlns:a16="http://schemas.microsoft.com/office/drawing/2014/main" xmlns="" id="{D47D1AB1-0D5F-464A-9291-060AAFA889BC}"/>
+                <a16:creationId xmlns="" xmlns:a16="http://schemas.microsoft.com/office/drawing/2014/main" id="{D47D1AB1-0D5F-464A-9291-060AAFA889BC}"/>
               </a:ext>
             </a:extLst>
           </p:cNvPr>
@@ -3382,7 +3382,7 @@
           <p:cNvPr id="4" name="Объект 3">
             <a:extLst>
               <a:ext uri="{FF2B5EF4-FFF2-40B4-BE49-F238E27FC236}">
-                <a16:creationId xmlns:a16="http://schemas.microsoft.com/office/drawing/2014/main" xmlns="" id="{5E27FA2F-D9B9-4928-B10C-81A693AFCA78}"/>
+                <a16:creationId xmlns="" xmlns:a16="http://schemas.microsoft.com/office/drawing/2014/main" id="{5E27FA2F-D9B9-4928-B10C-81A693AFCA78}"/>
               </a:ext>
             </a:extLst>
           </p:cNvPr>
@@ -3444,7 +3444,7 @@
           <p:cNvPr id="5" name="Текст 4">
             <a:extLst>
               <a:ext uri="{FF2B5EF4-FFF2-40B4-BE49-F238E27FC236}">
-                <a16:creationId xmlns:a16="http://schemas.microsoft.com/office/drawing/2014/main" xmlns="" id="{6A0916C0-69A9-410A-9C75-E2C84F590E50}"/>
+                <a16:creationId xmlns="" xmlns:a16="http://schemas.microsoft.com/office/drawing/2014/main" id="{6A0916C0-69A9-410A-9C75-E2C84F590E50}"/>
               </a:ext>
             </a:extLst>
           </p:cNvPr>
@@ -3515,7 +3515,7 @@
           <p:cNvPr id="6" name="Объект 5">
             <a:extLst>
               <a:ext uri="{FF2B5EF4-FFF2-40B4-BE49-F238E27FC236}">
-                <a16:creationId xmlns:a16="http://schemas.microsoft.com/office/drawing/2014/main" xmlns="" id="{0D3E262A-AF9C-4394-B604-A81A5E9AB3D7}"/>
+                <a16:creationId xmlns="" xmlns:a16="http://schemas.microsoft.com/office/drawing/2014/main" id="{0D3E262A-AF9C-4394-B604-A81A5E9AB3D7}"/>
               </a:ext>
             </a:extLst>
           </p:cNvPr>
@@ -3577,7 +3577,7 @@
           <p:cNvPr id="7" name="Дата 6">
             <a:extLst>
               <a:ext uri="{FF2B5EF4-FFF2-40B4-BE49-F238E27FC236}">
-                <a16:creationId xmlns:a16="http://schemas.microsoft.com/office/drawing/2014/main" xmlns="" id="{8A83B39A-A7B0-403A-92D3-5A79FC242B82}"/>
+                <a16:creationId xmlns="" xmlns:a16="http://schemas.microsoft.com/office/drawing/2014/main" id="{8A83B39A-A7B0-403A-92D3-5A79FC242B82}"/>
               </a:ext>
             </a:extLst>
           </p:cNvPr>
@@ -3606,7 +3606,7 @@
           <p:cNvPr id="8" name="Нижний колонтитул 7">
             <a:extLst>
               <a:ext uri="{FF2B5EF4-FFF2-40B4-BE49-F238E27FC236}">
-                <a16:creationId xmlns:a16="http://schemas.microsoft.com/office/drawing/2014/main" xmlns="" id="{DAD80004-5F39-4B5F-B59D-B0EEF5350767}"/>
+                <a16:creationId xmlns="" xmlns:a16="http://schemas.microsoft.com/office/drawing/2014/main" id="{DAD80004-5F39-4B5F-B59D-B0EEF5350767}"/>
               </a:ext>
             </a:extLst>
           </p:cNvPr>
@@ -3631,7 +3631,7 @@
           <p:cNvPr id="9" name="Номер слайда 8">
             <a:extLst>
               <a:ext uri="{FF2B5EF4-FFF2-40B4-BE49-F238E27FC236}">
-                <a16:creationId xmlns:a16="http://schemas.microsoft.com/office/drawing/2014/main" xmlns="" id="{E7885D92-53E2-4D39-AA80-F09E1DBFC674}"/>
+                <a16:creationId xmlns="" xmlns:a16="http://schemas.microsoft.com/office/drawing/2014/main" id="{E7885D92-53E2-4D39-AA80-F09E1DBFC674}"/>
               </a:ext>
             </a:extLst>
           </p:cNvPr>
@@ -3690,7 +3690,7 @@
           <p:cNvPr id="2" name="Заголовок 1">
             <a:extLst>
               <a:ext uri="{FF2B5EF4-FFF2-40B4-BE49-F238E27FC236}">
-                <a16:creationId xmlns:a16="http://schemas.microsoft.com/office/drawing/2014/main" xmlns="" id="{7074581F-EF87-489A-B58D-1B988CC3C1E7}"/>
+                <a16:creationId xmlns="" xmlns:a16="http://schemas.microsoft.com/office/drawing/2014/main" id="{7074581F-EF87-489A-B58D-1B988CC3C1E7}"/>
               </a:ext>
             </a:extLst>
           </p:cNvPr>
@@ -3718,7 +3718,7 @@
           <p:cNvPr id="3" name="Дата 2">
             <a:extLst>
               <a:ext uri="{FF2B5EF4-FFF2-40B4-BE49-F238E27FC236}">
-                <a16:creationId xmlns:a16="http://schemas.microsoft.com/office/drawing/2014/main" xmlns="" id="{7B3DE8FB-DFDB-4490-94D7-D9C25638BB3E}"/>
+                <a16:creationId xmlns="" xmlns:a16="http://schemas.microsoft.com/office/drawing/2014/main" id="{7B3DE8FB-DFDB-4490-94D7-D9C25638BB3E}"/>
               </a:ext>
             </a:extLst>
           </p:cNvPr>
@@ -3747,7 +3747,7 @@
           <p:cNvPr id="4" name="Нижний колонтитул 3">
             <a:extLst>
               <a:ext uri="{FF2B5EF4-FFF2-40B4-BE49-F238E27FC236}">
-                <a16:creationId xmlns:a16="http://schemas.microsoft.com/office/drawing/2014/main" xmlns="" id="{A34EB3A9-F085-472D-BFD1-5C5B6292C1E1}"/>
+                <a16:creationId xmlns="" xmlns:a16="http://schemas.microsoft.com/office/drawing/2014/main" id="{A34EB3A9-F085-472D-BFD1-5C5B6292C1E1}"/>
               </a:ext>
             </a:extLst>
           </p:cNvPr>
@@ -3772,7 +3772,7 @@
           <p:cNvPr id="5" name="Номер слайда 4">
             <a:extLst>
               <a:ext uri="{FF2B5EF4-FFF2-40B4-BE49-F238E27FC236}">
-                <a16:creationId xmlns:a16="http://schemas.microsoft.com/office/drawing/2014/main" xmlns="" id="{8F3E70F5-2CAD-4E0D-A017-3F49D17938A6}"/>
+                <a16:creationId xmlns="" xmlns:a16="http://schemas.microsoft.com/office/drawing/2014/main" id="{8F3E70F5-2CAD-4E0D-A017-3F49D17938A6}"/>
               </a:ext>
             </a:extLst>
           </p:cNvPr>
@@ -3831,7 +3831,7 @@
           <p:cNvPr id="2" name="Дата 1">
             <a:extLst>
               <a:ext uri="{FF2B5EF4-FFF2-40B4-BE49-F238E27FC236}">
-                <a16:creationId xmlns:a16="http://schemas.microsoft.com/office/drawing/2014/main" xmlns="" id="{F5FF0D3A-99BF-4B6F-AF9F-23827DF357AC}"/>
+                <a16:creationId xmlns="" xmlns:a16="http://schemas.microsoft.com/office/drawing/2014/main" id="{F5FF0D3A-99BF-4B6F-AF9F-23827DF357AC}"/>
               </a:ext>
             </a:extLst>
           </p:cNvPr>
@@ -3860,7 +3860,7 @@
           <p:cNvPr id="3" name="Нижний колонтитул 2">
             <a:extLst>
               <a:ext uri="{FF2B5EF4-FFF2-40B4-BE49-F238E27FC236}">
-                <a16:creationId xmlns:a16="http://schemas.microsoft.com/office/drawing/2014/main" xmlns="" id="{4FDD1EC1-64DB-4910-A147-042C2B305BBB}"/>
+                <a16:creationId xmlns="" xmlns:a16="http://schemas.microsoft.com/office/drawing/2014/main" id="{4FDD1EC1-64DB-4910-A147-042C2B305BBB}"/>
               </a:ext>
             </a:extLst>
           </p:cNvPr>
@@ -3885,7 +3885,7 @@
           <p:cNvPr id="4" name="Номер слайда 3">
             <a:extLst>
               <a:ext uri="{FF2B5EF4-FFF2-40B4-BE49-F238E27FC236}">
-                <a16:creationId xmlns:a16="http://schemas.microsoft.com/office/drawing/2014/main" xmlns="" id="{2E47387D-3BAF-431D-951A-7C294AA3053B}"/>
+                <a16:creationId xmlns="" xmlns:a16="http://schemas.microsoft.com/office/drawing/2014/main" id="{2E47387D-3BAF-431D-951A-7C294AA3053B}"/>
               </a:ext>
             </a:extLst>
           </p:cNvPr>
@@ -3944,7 +3944,7 @@
           <p:cNvPr id="2" name="Заголовок 1">
             <a:extLst>
               <a:ext uri="{FF2B5EF4-FFF2-40B4-BE49-F238E27FC236}">
-                <a16:creationId xmlns:a16="http://schemas.microsoft.com/office/drawing/2014/main" xmlns="" id="{9083593B-4106-4F1B-AE32-475176E2C661}"/>
+                <a16:creationId xmlns="" xmlns:a16="http://schemas.microsoft.com/office/drawing/2014/main" id="{9083593B-4106-4F1B-AE32-475176E2C661}"/>
               </a:ext>
             </a:extLst>
           </p:cNvPr>
@@ -3981,7 +3981,7 @@
           <p:cNvPr id="3" name="Объект 2">
             <a:extLst>
               <a:ext uri="{FF2B5EF4-FFF2-40B4-BE49-F238E27FC236}">
-                <a16:creationId xmlns:a16="http://schemas.microsoft.com/office/drawing/2014/main" xmlns="" id="{E4DC0413-EFFF-4626-88E3-3EFE9304FA4D}"/>
+                <a16:creationId xmlns="" xmlns:a16="http://schemas.microsoft.com/office/drawing/2014/main" id="{E4DC0413-EFFF-4626-88E3-3EFE9304FA4D}"/>
               </a:ext>
             </a:extLst>
           </p:cNvPr>
@@ -4071,7 +4071,7 @@
           <p:cNvPr id="4" name="Текст 3">
             <a:extLst>
               <a:ext uri="{FF2B5EF4-FFF2-40B4-BE49-F238E27FC236}">
-                <a16:creationId xmlns:a16="http://schemas.microsoft.com/office/drawing/2014/main" xmlns="" id="{A02187E3-F84A-46B5-8050-210442747E0F}"/>
+                <a16:creationId xmlns="" xmlns:a16="http://schemas.microsoft.com/office/drawing/2014/main" id="{A02187E3-F84A-46B5-8050-210442747E0F}"/>
               </a:ext>
             </a:extLst>
           </p:cNvPr>
@@ -4142,7 +4142,7 @@
           <p:cNvPr id="5" name="Дата 4">
             <a:extLst>
               <a:ext uri="{FF2B5EF4-FFF2-40B4-BE49-F238E27FC236}">
-                <a16:creationId xmlns:a16="http://schemas.microsoft.com/office/drawing/2014/main" xmlns="" id="{730B3A67-E230-4AF8-BFD9-DA2D53BC95E1}"/>
+                <a16:creationId xmlns="" xmlns:a16="http://schemas.microsoft.com/office/drawing/2014/main" id="{730B3A67-E230-4AF8-BFD9-DA2D53BC95E1}"/>
               </a:ext>
             </a:extLst>
           </p:cNvPr>
@@ -4171,7 +4171,7 @@
           <p:cNvPr id="6" name="Нижний колонтитул 5">
             <a:extLst>
               <a:ext uri="{FF2B5EF4-FFF2-40B4-BE49-F238E27FC236}">
-                <a16:creationId xmlns:a16="http://schemas.microsoft.com/office/drawing/2014/main" xmlns="" id="{83D73375-EA66-448E-B044-225944D95EFB}"/>
+                <a16:creationId xmlns="" xmlns:a16="http://schemas.microsoft.com/office/drawing/2014/main" id="{83D73375-EA66-448E-B044-225944D95EFB}"/>
               </a:ext>
             </a:extLst>
           </p:cNvPr>
@@ -4196,7 +4196,7 @@
           <p:cNvPr id="7" name="Номер слайда 6">
             <a:extLst>
               <a:ext uri="{FF2B5EF4-FFF2-40B4-BE49-F238E27FC236}">
-                <a16:creationId xmlns:a16="http://schemas.microsoft.com/office/drawing/2014/main" xmlns="" id="{B103997E-95DA-4893-ACAC-113DBFE6E598}"/>
+                <a16:creationId xmlns="" xmlns:a16="http://schemas.microsoft.com/office/drawing/2014/main" id="{B103997E-95DA-4893-ACAC-113DBFE6E598}"/>
               </a:ext>
             </a:extLst>
           </p:cNvPr>
@@ -4255,7 +4255,7 @@
           <p:cNvPr id="2" name="Заголовок 1">
             <a:extLst>
               <a:ext uri="{FF2B5EF4-FFF2-40B4-BE49-F238E27FC236}">
-                <a16:creationId xmlns:a16="http://schemas.microsoft.com/office/drawing/2014/main" xmlns="" id="{288E070C-CD9D-4A01-9EAB-7C47A72EE604}"/>
+                <a16:creationId xmlns="" xmlns:a16="http://schemas.microsoft.com/office/drawing/2014/main" id="{288E070C-CD9D-4A01-9EAB-7C47A72EE604}"/>
               </a:ext>
             </a:extLst>
           </p:cNvPr>
@@ -4292,7 +4292,7 @@
           <p:cNvPr id="3" name="Рисунок 2">
             <a:extLst>
               <a:ext uri="{FF2B5EF4-FFF2-40B4-BE49-F238E27FC236}">
-                <a16:creationId xmlns:a16="http://schemas.microsoft.com/office/drawing/2014/main" xmlns="" id="{D7C2E05B-A5DA-466D-BAE6-56F09C0BA937}"/>
+                <a16:creationId xmlns="" xmlns:a16="http://schemas.microsoft.com/office/drawing/2014/main" id="{D7C2E05B-A5DA-466D-BAE6-56F09C0BA937}"/>
               </a:ext>
             </a:extLst>
           </p:cNvPr>
@@ -4359,7 +4359,7 @@
           <p:cNvPr id="4" name="Текст 3">
             <a:extLst>
               <a:ext uri="{FF2B5EF4-FFF2-40B4-BE49-F238E27FC236}">
-                <a16:creationId xmlns:a16="http://schemas.microsoft.com/office/drawing/2014/main" xmlns="" id="{C8ADC2AA-C5DE-4F15-9C18-C9F69563AC72}"/>
+                <a16:creationId xmlns="" xmlns:a16="http://schemas.microsoft.com/office/drawing/2014/main" id="{C8ADC2AA-C5DE-4F15-9C18-C9F69563AC72}"/>
               </a:ext>
             </a:extLst>
           </p:cNvPr>
@@ -4430,7 +4430,7 @@
           <p:cNvPr id="5" name="Дата 4">
             <a:extLst>
               <a:ext uri="{FF2B5EF4-FFF2-40B4-BE49-F238E27FC236}">
-                <a16:creationId xmlns:a16="http://schemas.microsoft.com/office/drawing/2014/main" xmlns="" id="{CFE2E688-97CE-4CBC-90B3-5E3DA7F2948A}"/>
+                <a16:creationId xmlns="" xmlns:a16="http://schemas.microsoft.com/office/drawing/2014/main" id="{CFE2E688-97CE-4CBC-90B3-5E3DA7F2948A}"/>
               </a:ext>
             </a:extLst>
           </p:cNvPr>
@@ -4459,7 +4459,7 @@
           <p:cNvPr id="6" name="Нижний колонтитул 5">
             <a:extLst>
               <a:ext uri="{FF2B5EF4-FFF2-40B4-BE49-F238E27FC236}">
-                <a16:creationId xmlns:a16="http://schemas.microsoft.com/office/drawing/2014/main" xmlns="" id="{ACF5F5C3-79C7-4337-9283-F10EF1924F1B}"/>
+                <a16:creationId xmlns="" xmlns:a16="http://schemas.microsoft.com/office/drawing/2014/main" id="{ACF5F5C3-79C7-4337-9283-F10EF1924F1B}"/>
               </a:ext>
             </a:extLst>
           </p:cNvPr>
@@ -4484,7 +4484,7 @@
           <p:cNvPr id="7" name="Номер слайда 6">
             <a:extLst>
               <a:ext uri="{FF2B5EF4-FFF2-40B4-BE49-F238E27FC236}">
-                <a16:creationId xmlns:a16="http://schemas.microsoft.com/office/drawing/2014/main" xmlns="" id="{9C94D0B7-B3F6-414E-BBEA-A6AD6F03027D}"/>
+                <a16:creationId xmlns="" xmlns:a16="http://schemas.microsoft.com/office/drawing/2014/main" id="{9C94D0B7-B3F6-414E-BBEA-A6AD6F03027D}"/>
               </a:ext>
             </a:extLst>
           </p:cNvPr>
@@ -4551,7 +4551,7 @@
           <p:cNvPr id="2" name="Заголовок 1">
             <a:extLst>
               <a:ext uri="{FF2B5EF4-FFF2-40B4-BE49-F238E27FC236}">
-                <a16:creationId xmlns:a16="http://schemas.microsoft.com/office/drawing/2014/main" xmlns="" id="{53D9738B-783C-401C-B2AE-43C8310602D8}"/>
+                <a16:creationId xmlns="" xmlns:a16="http://schemas.microsoft.com/office/drawing/2014/main" id="{53D9738B-783C-401C-B2AE-43C8310602D8}"/>
               </a:ext>
             </a:extLst>
           </p:cNvPr>
@@ -4589,7 +4589,7 @@
           <p:cNvPr id="3" name="Текст 2">
             <a:extLst>
               <a:ext uri="{FF2B5EF4-FFF2-40B4-BE49-F238E27FC236}">
-                <a16:creationId xmlns:a16="http://schemas.microsoft.com/office/drawing/2014/main" xmlns="" id="{960DD51F-6688-45C0-BE25-46DC3741DF20}"/>
+                <a16:creationId xmlns="" xmlns:a16="http://schemas.microsoft.com/office/drawing/2014/main" id="{960DD51F-6688-45C0-BE25-46DC3741DF20}"/>
               </a:ext>
             </a:extLst>
           </p:cNvPr>
@@ -4656,7 +4656,7 @@
           <p:cNvPr id="4" name="Дата 3">
             <a:extLst>
               <a:ext uri="{FF2B5EF4-FFF2-40B4-BE49-F238E27FC236}">
-                <a16:creationId xmlns:a16="http://schemas.microsoft.com/office/drawing/2014/main" xmlns="" id="{291801BB-9555-44F2-B2B8-929D33E9496C}"/>
+                <a16:creationId xmlns="" xmlns:a16="http://schemas.microsoft.com/office/drawing/2014/main" id="{291801BB-9555-44F2-B2B8-929D33E9496C}"/>
               </a:ext>
             </a:extLst>
           </p:cNvPr>
@@ -4703,7 +4703,7 @@
           <p:cNvPr id="5" name="Нижний колонтитул 4">
             <a:extLst>
               <a:ext uri="{FF2B5EF4-FFF2-40B4-BE49-F238E27FC236}">
-                <a16:creationId xmlns:a16="http://schemas.microsoft.com/office/drawing/2014/main" xmlns="" id="{1A35D81B-5CAF-488E-879F-3CA4B2A31E5B}"/>
+                <a16:creationId xmlns="" xmlns:a16="http://schemas.microsoft.com/office/drawing/2014/main" id="{1A35D81B-5CAF-488E-879F-3CA4B2A31E5B}"/>
               </a:ext>
             </a:extLst>
           </p:cNvPr>
@@ -4746,7 +4746,7 @@
           <p:cNvPr id="6" name="Номер слайда 5">
             <a:extLst>
               <a:ext uri="{FF2B5EF4-FFF2-40B4-BE49-F238E27FC236}">
-                <a16:creationId xmlns:a16="http://schemas.microsoft.com/office/drawing/2014/main" xmlns="" id="{93D6702C-BB87-4F87-81E7-3FD524360721}"/>
+                <a16:creationId xmlns="" xmlns:a16="http://schemas.microsoft.com/office/drawing/2014/main" id="{93D6702C-BB87-4F87-81E7-3FD524360721}"/>
               </a:ext>
             </a:extLst>
           </p:cNvPr>
@@ -5114,7 +5114,7 @@
           <p:cNvPr id="3" name="Подзаголовок 2">
             <a:extLst>
               <a:ext uri="{FF2B5EF4-FFF2-40B4-BE49-F238E27FC236}">
-                <a16:creationId xmlns:a16="http://schemas.microsoft.com/office/drawing/2014/main" xmlns="" id="{BCA01FE3-5996-447B-8785-D69CB5FB4FAB}"/>
+                <a16:creationId xmlns="" xmlns:a16="http://schemas.microsoft.com/office/drawing/2014/main" id="{BCA01FE3-5996-447B-8785-D69CB5FB4FAB}"/>
               </a:ext>
             </a:extLst>
           </p:cNvPr>
@@ -5260,7 +5260,7 @@
           <p:cNvPr id="2" name="Заголовок 1">
             <a:extLst>
               <a:ext uri="{FF2B5EF4-FFF2-40B4-BE49-F238E27FC236}">
-                <a16:creationId xmlns:a16="http://schemas.microsoft.com/office/drawing/2014/main" xmlns="" id="{6B39BEEA-C541-48CC-BEF6-3E70E7933948}"/>
+                <a16:creationId xmlns="" xmlns:a16="http://schemas.microsoft.com/office/drawing/2014/main" id="{6B39BEEA-C541-48CC-BEF6-3E70E7933948}"/>
               </a:ext>
             </a:extLst>
           </p:cNvPr>
@@ -5306,7 +5306,7 @@
           <p:cNvPr id="3" name="Объект 2">
             <a:extLst>
               <a:ext uri="{FF2B5EF4-FFF2-40B4-BE49-F238E27FC236}">
-                <a16:creationId xmlns:a16="http://schemas.microsoft.com/office/drawing/2014/main" xmlns="" id="{00158481-D098-4A9D-86B7-E67841394BCD}"/>
+                <a16:creationId xmlns="" xmlns:a16="http://schemas.microsoft.com/office/drawing/2014/main" id="{00158481-D098-4A9D-86B7-E67841394BCD}"/>
               </a:ext>
             </a:extLst>
           </p:cNvPr>
@@ -5513,7 +5513,7 @@
           <p:cNvPr id="2" name="Заголовок 1">
             <a:extLst>
               <a:ext uri="{FF2B5EF4-FFF2-40B4-BE49-F238E27FC236}">
-                <a16:creationId xmlns:a16="http://schemas.microsoft.com/office/drawing/2014/main" xmlns="" id="{125A25BB-4BB1-40FD-B48C-440BA8052EFC}"/>
+                <a16:creationId xmlns="" xmlns:a16="http://schemas.microsoft.com/office/drawing/2014/main" id="{125A25BB-4BB1-40FD-B48C-440BA8052EFC}"/>
               </a:ext>
             </a:extLst>
           </p:cNvPr>
@@ -5624,6 +5624,115 @@
           </a:xfrm>
         </p:spPr>
       </p:pic>
+      <p:sp>
+        <p:nvSpPr>
+          <p:cNvPr id="3" name="TextBox 2"/>
+          <p:cNvSpPr txBox="1"/>
+          <p:nvPr/>
+        </p:nvSpPr>
+        <p:spPr>
+          <a:xfrm>
+            <a:off x="3524597" y="2499360"/>
+            <a:ext cx="1306768" cy="1200329"/>
+          </a:xfrm>
+          <a:prstGeom prst="rect">
+            <a:avLst/>
+          </a:prstGeom>
+          <a:noFill/>
+        </p:spPr>
+        <p:txBody>
+          <a:bodyPr wrap="none" rtlCol="0">
+            <a:spAutoFit/>
+          </a:bodyPr>
+          <a:lstStyle/>
+          <a:p>
+            <a:r>
+              <a:rPr lang="ru-RU" dirty="0" smtClean="0">
+                <a:solidFill>
+                  <a:srgbClr val="2B2EFF"/>
+                </a:solidFill>
+                <a:latin typeface="Helvetica" charset="0"/>
+                <a:ea typeface="Helvetica" charset="0"/>
+                <a:cs typeface="Helvetica" charset="0"/>
+              </a:rPr>
+              <a:t>Смех</a:t>
+            </a:r>
+            <a:r>
+              <a:rPr lang="ru-RU" dirty="0" smtClean="0">
+                <a:latin typeface="Helvetica" charset="0"/>
+                <a:ea typeface="Helvetica" charset="0"/>
+                <a:cs typeface="Helvetica" charset="0"/>
+              </a:rPr>
+              <a:t/>
+            </a:r>
+            <a:br>
+              <a:rPr lang="ru-RU" dirty="0" smtClean="0">
+                <a:latin typeface="Helvetica" charset="0"/>
+                <a:ea typeface="Helvetica" charset="0"/>
+                <a:cs typeface="Helvetica" charset="0"/>
+              </a:rPr>
+            </a:br>
+            <a:r>
+              <a:rPr lang="ru-RU" dirty="0" smtClean="0">
+                <a:solidFill>
+                  <a:srgbClr val="FF0E0D"/>
+                </a:solidFill>
+                <a:latin typeface="Helvetica" charset="0"/>
+                <a:ea typeface="Helvetica" charset="0"/>
+                <a:cs typeface="Helvetica" charset="0"/>
+              </a:rPr>
+              <a:t>Движение</a:t>
+            </a:r>
+            <a:endParaRPr lang="en-US" dirty="0" smtClean="0">
+              <a:solidFill>
+                <a:srgbClr val="FF0E0D"/>
+              </a:solidFill>
+              <a:latin typeface="Helvetica" charset="0"/>
+              <a:ea typeface="Helvetica" charset="0"/>
+              <a:cs typeface="Helvetica" charset="0"/>
+            </a:endParaRPr>
+          </a:p>
+          <a:p>
+            <a:r>
+              <a:rPr lang="ru-RU" dirty="0" smtClean="0">
+                <a:solidFill>
+                  <a:schemeClr val="accent4"/>
+                </a:solidFill>
+                <a:latin typeface="Helvetica" charset="0"/>
+                <a:ea typeface="Helvetica" charset="0"/>
+                <a:cs typeface="Helvetica" charset="0"/>
+              </a:rPr>
+              <a:t>Солнце</a:t>
+            </a:r>
+            <a:r>
+              <a:rPr lang="ru-RU" dirty="0" smtClean="0">
+                <a:latin typeface="Helvetica" charset="0"/>
+                <a:ea typeface="Helvetica" charset="0"/>
+                <a:cs typeface="Helvetica" charset="0"/>
+              </a:rPr>
+              <a:t/>
+            </a:r>
+            <a:br>
+              <a:rPr lang="ru-RU" dirty="0" smtClean="0">
+                <a:latin typeface="Helvetica" charset="0"/>
+                <a:ea typeface="Helvetica" charset="0"/>
+                <a:cs typeface="Helvetica" charset="0"/>
+              </a:rPr>
+            </a:br>
+            <a:r>
+              <a:rPr lang="ru-RU" dirty="0" smtClean="0">
+                <a:solidFill>
+                  <a:srgbClr val="048206"/>
+                </a:solidFill>
+                <a:latin typeface="Helvetica" charset="0"/>
+                <a:ea typeface="Helvetica" charset="0"/>
+                <a:cs typeface="Helvetica" charset="0"/>
+              </a:rPr>
+              <a:t>Пьянство</a:t>
+            </a:r>
+          </a:p>
+        </p:txBody>
+      </p:sp>
     </p:spTree>
     <p:extLst>
       <p:ext uri="{BB962C8B-B14F-4D97-AF65-F5344CB8AC3E}">
@@ -5750,7 +5859,7 @@
           <p:cNvPr id="4" name="Chart 2">
             <a:extLst>
               <a:ext uri="{FF2B5EF4-FFF2-40B4-BE49-F238E27FC236}">
-                <a16:creationId xmlns="" xmlns:xdr="http://schemas.openxmlformats.org/drawingml/2006/spreadsheetDrawing" xmlns:a16="http://schemas.microsoft.com/office/drawing/2014/main" xmlns:lc="http://schemas.openxmlformats.org/drawingml/2006/lockedCanvas" id="{BF60D29B-DAA0-4F69-A445-44E94912E54D}"/>
+                <a16:creationId xmlns:lc="http://schemas.openxmlformats.org/drawingml/2006/lockedCanvas" xmlns:a16="http://schemas.microsoft.com/office/drawing/2014/main" xmlns:xdr="http://schemas.openxmlformats.org/drawingml/2006/spreadsheetDrawing" xmlns="" id="{BF60D29B-DAA0-4F69-A445-44E94912E54D}"/>
               </a:ext>
             </a:extLst>
           </p:cNvPr>
@@ -7364,7 +7473,7 @@
           <p:cNvPr id="2" name="Заголовок 1">
             <a:extLst>
               <a:ext uri="{FF2B5EF4-FFF2-40B4-BE49-F238E27FC236}">
-                <a16:creationId xmlns:a16="http://schemas.microsoft.com/office/drawing/2014/main" xmlns="" id="{CCCA1532-073C-487E-97E8-CD6D18B96191}"/>
+                <a16:creationId xmlns="" xmlns:a16="http://schemas.microsoft.com/office/drawing/2014/main" id="{CCCA1532-073C-487E-97E8-CD6D18B96191}"/>
               </a:ext>
             </a:extLst>
           </p:cNvPr>
@@ -7404,7 +7513,7 @@
           <p:cNvPr id="4" name="Текст 3">
             <a:extLst>
               <a:ext uri="{FF2B5EF4-FFF2-40B4-BE49-F238E27FC236}">
-                <a16:creationId xmlns:a16="http://schemas.microsoft.com/office/drawing/2014/main" xmlns="" id="{E64C11F9-BD84-4E8A-B086-E6A9426AF879}"/>
+                <a16:creationId xmlns="" xmlns:a16="http://schemas.microsoft.com/office/drawing/2014/main" id="{E64C11F9-BD84-4E8A-B086-E6A9426AF879}"/>
               </a:ext>
             </a:extLst>
           </p:cNvPr>
@@ -7497,7 +7606,7 @@
           <p:cNvPr id="4" name="TextBox 3">
             <a:extLst>
               <a:ext uri="{FF2B5EF4-FFF2-40B4-BE49-F238E27FC236}">
-                <a16:creationId xmlns:a16="http://schemas.microsoft.com/office/drawing/2014/main" xmlns="" id="{7B9A3133-5277-4B9C-BB8E-57A8A2B317B9}"/>
+                <a16:creationId xmlns="" xmlns:a16="http://schemas.microsoft.com/office/drawing/2014/main" id="{7B9A3133-5277-4B9C-BB8E-57A8A2B317B9}"/>
               </a:ext>
             </a:extLst>
           </p:cNvPr>
@@ -7552,7 +7661,7 @@
           <p:cNvPr id="5" name="TextBox 4">
             <a:extLst>
               <a:ext uri="{FF2B5EF4-FFF2-40B4-BE49-F238E27FC236}">
-                <a16:creationId xmlns:a16="http://schemas.microsoft.com/office/drawing/2014/main" xmlns="" id="{87E90116-7914-4229-BF63-61092BFF6509}"/>
+                <a16:creationId xmlns="" xmlns:a16="http://schemas.microsoft.com/office/drawing/2014/main" id="{87E90116-7914-4229-BF63-61092BFF6509}"/>
               </a:ext>
             </a:extLst>
           </p:cNvPr>
@@ -7811,7 +7920,7 @@
           <p:cNvPr id="2" name="TextBox 1">
             <a:extLst>
               <a:ext uri="{FF2B5EF4-FFF2-40B4-BE49-F238E27FC236}">
-                <a16:creationId xmlns:a16="http://schemas.microsoft.com/office/drawing/2014/main" xmlns="" id="{6571D1C7-D84E-4EE5-ADB3-7D12A6F1C938}"/>
+                <a16:creationId xmlns="" xmlns:a16="http://schemas.microsoft.com/office/drawing/2014/main" id="{6571D1C7-D84E-4EE5-ADB3-7D12A6F1C938}"/>
               </a:ext>
             </a:extLst>
           </p:cNvPr>
@@ -7908,7 +8017,7 @@
           <p:cNvPr id="4" name="Текст 3">
             <a:extLst>
               <a:ext uri="{FF2B5EF4-FFF2-40B4-BE49-F238E27FC236}">
-                <a16:creationId xmlns:a16="http://schemas.microsoft.com/office/drawing/2014/main" xmlns="" id="{DDAADB80-3FA1-4491-A081-15B69B29E417}"/>
+                <a16:creationId xmlns="" xmlns:a16="http://schemas.microsoft.com/office/drawing/2014/main" id="{DDAADB80-3FA1-4491-A081-15B69B29E417}"/>
               </a:ext>
             </a:extLst>
           </p:cNvPr>
@@ -7995,7 +8104,7 @@
           <p:cNvPr id="5" name="Объект 4">
             <a:extLst>
               <a:ext uri="{FF2B5EF4-FFF2-40B4-BE49-F238E27FC236}">
-                <a16:creationId xmlns:a16="http://schemas.microsoft.com/office/drawing/2014/main" xmlns="" id="{5740A3D8-8B5B-4E22-99C6-73EFE0AA2E10}"/>
+                <a16:creationId xmlns="" xmlns:a16="http://schemas.microsoft.com/office/drawing/2014/main" id="{5740A3D8-8B5B-4E22-99C6-73EFE0AA2E10}"/>
               </a:ext>
             </a:extLst>
           </p:cNvPr>
@@ -8082,7 +8191,7 @@
           <p:cNvPr id="6" name="Текст 5">
             <a:extLst>
               <a:ext uri="{FF2B5EF4-FFF2-40B4-BE49-F238E27FC236}">
-                <a16:creationId xmlns:a16="http://schemas.microsoft.com/office/drawing/2014/main" xmlns="" id="{3FC3DF72-78EC-47C6-98B6-C7558A986498}"/>
+                <a16:creationId xmlns="" xmlns:a16="http://schemas.microsoft.com/office/drawing/2014/main" id="{3FC3DF72-78EC-47C6-98B6-C7558A986498}"/>
               </a:ext>
             </a:extLst>
           </p:cNvPr>
@@ -8161,7 +8270,7 @@
           <p:cNvPr id="7" name="Объект 6">
             <a:extLst>
               <a:ext uri="{FF2B5EF4-FFF2-40B4-BE49-F238E27FC236}">
-                <a16:creationId xmlns:a16="http://schemas.microsoft.com/office/drawing/2014/main" xmlns="" id="{FC0A36E1-9E0A-462B-A1F9-0316C03323A2}"/>
+                <a16:creationId xmlns="" xmlns:a16="http://schemas.microsoft.com/office/drawing/2014/main" id="{FC0A36E1-9E0A-462B-A1F9-0316C03323A2}"/>
               </a:ext>
             </a:extLst>
           </p:cNvPr>
@@ -8311,7 +8420,7 @@
           <p:cNvPr id="7" name="Заголовок 6">
             <a:extLst>
               <a:ext uri="{FF2B5EF4-FFF2-40B4-BE49-F238E27FC236}">
-                <a16:creationId xmlns:a16="http://schemas.microsoft.com/office/drawing/2014/main" xmlns="" id="{A7CF4BD6-182A-4544-8182-101FCAC8548E}"/>
+                <a16:creationId xmlns="" xmlns:a16="http://schemas.microsoft.com/office/drawing/2014/main" id="{A7CF4BD6-182A-4544-8182-101FCAC8548E}"/>
               </a:ext>
             </a:extLst>
           </p:cNvPr>
@@ -8346,7 +8455,7 @@
           <p:cNvPr id="10" name="Объект 9">
             <a:extLst>
               <a:ext uri="{FF2B5EF4-FFF2-40B4-BE49-F238E27FC236}">
-                <a16:creationId xmlns:a16="http://schemas.microsoft.com/office/drawing/2014/main" xmlns="" id="{96061B44-ED9F-4707-8D57-6A39B2CF3957}"/>
+                <a16:creationId xmlns="" xmlns:a16="http://schemas.microsoft.com/office/drawing/2014/main" id="{96061B44-ED9F-4707-8D57-6A39B2CF3957}"/>
               </a:ext>
             </a:extLst>
           </p:cNvPr>
@@ -8452,7 +8561,7 @@
           <p:cNvPr id="17" name="Объект 16">
             <a:extLst>
               <a:ext uri="{FF2B5EF4-FFF2-40B4-BE49-F238E27FC236}">
-                <a16:creationId xmlns:a16="http://schemas.microsoft.com/office/drawing/2014/main" xmlns="" id="{9FC54163-EE5E-4879-A2BC-5963D8164686}"/>
+                <a16:creationId xmlns="" xmlns:a16="http://schemas.microsoft.com/office/drawing/2014/main" id="{9FC54163-EE5E-4879-A2BC-5963D8164686}"/>
               </a:ext>
             </a:extLst>
           </p:cNvPr>
@@ -8487,7 +8596,7 @@
           <p:cNvPr id="5" name="Заголовок 1">
             <a:extLst>
               <a:ext uri="{FF2B5EF4-FFF2-40B4-BE49-F238E27FC236}">
-                <a16:creationId xmlns:a16="http://schemas.microsoft.com/office/drawing/2014/main" xmlns="" id="{5AE487BB-93AF-4AD0-A82F-572C1EB32E65}"/>
+                <a16:creationId xmlns="" xmlns:a16="http://schemas.microsoft.com/office/drawing/2014/main" id="{5AE487BB-93AF-4AD0-A82F-572C1EB32E65}"/>
               </a:ext>
             </a:extLst>
           </p:cNvPr>
@@ -8596,7 +8705,7 @@
           <p:cNvPr id="2" name="Заголовок 1">
             <a:extLst>
               <a:ext uri="{FF2B5EF4-FFF2-40B4-BE49-F238E27FC236}">
-                <a16:creationId xmlns:a16="http://schemas.microsoft.com/office/drawing/2014/main" xmlns="" id="{655886CE-9CE8-4640-9B54-335049D5A48E}"/>
+                <a16:creationId xmlns="" xmlns:a16="http://schemas.microsoft.com/office/drawing/2014/main" id="{655886CE-9CE8-4640-9B54-335049D5A48E}"/>
               </a:ext>
             </a:extLst>
           </p:cNvPr>
@@ -8635,7 +8744,7 @@
           <p:cNvPr id="4" name="Текст 3">
             <a:extLst>
               <a:ext uri="{FF2B5EF4-FFF2-40B4-BE49-F238E27FC236}">
-                <a16:creationId xmlns:a16="http://schemas.microsoft.com/office/drawing/2014/main" xmlns="" id="{B18AE2EE-E4E3-4440-9CDF-C910405F7B81}"/>
+                <a16:creationId xmlns="" xmlns:a16="http://schemas.microsoft.com/office/drawing/2014/main" id="{B18AE2EE-E4E3-4440-9CDF-C910405F7B81}"/>
               </a:ext>
             </a:extLst>
           </p:cNvPr>
@@ -8727,7 +8836,7 @@
           <p:cNvPr id="6" name="Текст 5">
             <a:extLst>
               <a:ext uri="{FF2B5EF4-FFF2-40B4-BE49-F238E27FC236}">
-                <a16:creationId xmlns:a16="http://schemas.microsoft.com/office/drawing/2014/main" xmlns="" id="{8E35DC7A-352D-44AD-B30D-26B9F0380DCE}"/>
+                <a16:creationId xmlns="" xmlns:a16="http://schemas.microsoft.com/office/drawing/2014/main" id="{8E35DC7A-352D-44AD-B30D-26B9F0380DCE}"/>
               </a:ext>
             </a:extLst>
           </p:cNvPr>
@@ -8765,7 +8874,7 @@
           <p:cNvPr id="7" name="Объект 6">
             <a:extLst>
               <a:ext uri="{FF2B5EF4-FFF2-40B4-BE49-F238E27FC236}">
-                <a16:creationId xmlns:a16="http://schemas.microsoft.com/office/drawing/2014/main" xmlns="" id="{D76593F4-83C4-4CC3-B7DA-828A5B75AFBD}"/>
+                <a16:creationId xmlns="" xmlns:a16="http://schemas.microsoft.com/office/drawing/2014/main" id="{D76593F4-83C4-4CC3-B7DA-828A5B75AFBD}"/>
               </a:ext>
             </a:extLst>
           </p:cNvPr>
@@ -8804,7 +8913,7 @@
           <p:cNvPr id="8" name="Текст 7">
             <a:extLst>
               <a:ext uri="{FF2B5EF4-FFF2-40B4-BE49-F238E27FC236}">
-                <a16:creationId xmlns:a16="http://schemas.microsoft.com/office/drawing/2014/main" xmlns="" id="{1394C65C-B0A3-4189-8FBD-B58C233A862F}"/>
+                <a16:creationId xmlns="" xmlns:a16="http://schemas.microsoft.com/office/drawing/2014/main" id="{1394C65C-B0A3-4189-8FBD-B58C233A862F}"/>
               </a:ext>
             </a:extLst>
           </p:cNvPr>
@@ -8842,7 +8951,7 @@
           <p:cNvPr id="9" name="Объект 8">
             <a:extLst>
               <a:ext uri="{FF2B5EF4-FFF2-40B4-BE49-F238E27FC236}">
-                <a16:creationId xmlns:a16="http://schemas.microsoft.com/office/drawing/2014/main" xmlns="" id="{F7E3E6E8-4142-42E8-B01E-FAFE5F1AB5DA}"/>
+                <a16:creationId xmlns="" xmlns:a16="http://schemas.microsoft.com/office/drawing/2014/main" id="{F7E3E6E8-4142-42E8-B01E-FAFE5F1AB5DA}"/>
               </a:ext>
             </a:extLst>
           </p:cNvPr>
@@ -8983,7 +9092,7 @@
           <p:cNvPr id="7" name="Заголовок 6">
             <a:extLst>
               <a:ext uri="{FF2B5EF4-FFF2-40B4-BE49-F238E27FC236}">
-                <a16:creationId xmlns:a16="http://schemas.microsoft.com/office/drawing/2014/main" xmlns="" id="{967DE051-A85C-4B8D-AA13-F372BF89866A}"/>
+                <a16:creationId xmlns="" xmlns:a16="http://schemas.microsoft.com/office/drawing/2014/main" id="{967DE051-A85C-4B8D-AA13-F372BF89866A}"/>
               </a:ext>
             </a:extLst>
           </p:cNvPr>
@@ -9023,7 +9132,7 @@
           <p:cNvPr id="8" name="Объект 7">
             <a:extLst>
               <a:ext uri="{FF2B5EF4-FFF2-40B4-BE49-F238E27FC236}">
-                <a16:creationId xmlns:a16="http://schemas.microsoft.com/office/drawing/2014/main" xmlns="" id="{D2CECBB9-BD46-40AA-8F54-B6ED05034E9F}"/>
+                <a16:creationId xmlns="" xmlns:a16="http://schemas.microsoft.com/office/drawing/2014/main" id="{D2CECBB9-BD46-40AA-8F54-B6ED05034E9F}"/>
               </a:ext>
             </a:extLst>
           </p:cNvPr>
@@ -9614,7 +9723,7 @@
           <p:cNvPr id="2" name="Заголовок 1">
             <a:extLst>
               <a:ext uri="{FF2B5EF4-FFF2-40B4-BE49-F238E27FC236}">
-                <a16:creationId xmlns:a16="http://schemas.microsoft.com/office/drawing/2014/main" xmlns="" id="{5AE487BB-93AF-4AD0-A82F-572C1EB32E65}"/>
+                <a16:creationId xmlns="" xmlns:a16="http://schemas.microsoft.com/office/drawing/2014/main" id="{5AE487BB-93AF-4AD0-A82F-572C1EB32E65}"/>
               </a:ext>
             </a:extLst>
           </p:cNvPr>
@@ -9647,7 +9756,7 @@
           <p:cNvPr id="3" name="Объект 2">
             <a:extLst>
               <a:ext uri="{FF2B5EF4-FFF2-40B4-BE49-F238E27FC236}">
-                <a16:creationId xmlns:a16="http://schemas.microsoft.com/office/drawing/2014/main" xmlns="" id="{C689FDE1-3B42-426D-BEB5-DE1F3F0F3173}"/>
+                <a16:creationId xmlns="" xmlns:a16="http://schemas.microsoft.com/office/drawing/2014/main" id="{C689FDE1-3B42-426D-BEB5-DE1F3F0F3173}"/>
               </a:ext>
             </a:extLst>
           </p:cNvPr>

</xml_diff>